<commit_message>
For Sprint06, part II
</commit_message>
<xml_diff>
--- a/Presentations/(7)16Nov2020.pptx
+++ b/Presentations/(7)16Nov2020.pptx
@@ -5797,8 +5797,13 @@
           <a:p>
             <a:r>
               <a:rPr lang="en-US" dirty="0"/>
-              <a:t>16 Nov 2020</a:t>
-            </a:r>
+              <a:t>CS 4360: </a:t>
+            </a:r>
+            <a:r>
+              <a:rPr lang="en-US"/>
+              <a:t>CubeSat Presentation</a:t>
+            </a:r>
+            <a:endParaRPr lang="en-US" dirty="0"/>
           </a:p>
         </p:txBody>
       </p:sp>

</xml_diff>